<commit_message>
Committing changes add lecture notes.
</commit_message>
<xml_diff>
--- a/courseMaterial/Objective-1-Java Language & Environment/3-Java_Features.pptx
+++ b/courseMaterial/Objective-1-Java Language & Environment/3-Java_Features.pptx
@@ -234,7 +234,7 @@
             <a:fld id="{68416927-5E9C-4E77-85FE-EE4C81C1DE39}" type="datetimeFigureOut">
               <a:rPr lang="en-US" smtClean="0"/>
               <a:pPr/>
-              <a:t>5/9/2020</a:t>
+              <a:t>5/10/2020</a:t>
             </a:fld>
             <a:endParaRPr lang="en-US" dirty="0"/>
           </a:p>
@@ -413,7 +413,7 @@
             <a:fld id="{FA798B7E-6604-4F74-86DB-B30627D56244}" type="datetimeFigureOut">
               <a:rPr lang="en-US" smtClean="0"/>
               <a:pPr/>
-              <a:t>5/9/2020</a:t>
+              <a:t>5/10/2020</a:t>
             </a:fld>
             <a:endParaRPr lang="en-US" dirty="0"/>
           </a:p>
@@ -4794,11 +4794,7 @@
             </a:r>
             <a:r>
               <a:rPr lang="en-US" dirty="0" smtClean="0"/>
-              <a:t>behavior</a:t>
-            </a:r>
-            <a:r>
-              <a:rPr lang="en-US" dirty="0" smtClean="0"/>
-              <a:t>.</a:t>
+              <a:t>behavior.</a:t>
             </a:r>
           </a:p>
           <a:p>
@@ -4910,35 +4906,6 @@
           <a:p>
             <a:pPr algn="ctr"/>
             <a:endParaRPr lang="en-US" sz="1200" dirty="0"/>
-          </a:p>
-        </p:txBody>
-      </p:sp>
-      <p:sp>
-        <p:nvSpPr>
-          <p:cNvPr id="5" name="Rectangle 4"/>
-          <p:cNvSpPr/>
-          <p:nvPr/>
-        </p:nvSpPr>
-        <p:spPr>
-          <a:xfrm>
-            <a:off x="4252386" y="3244334"/>
-            <a:ext cx="3687228" cy="369332"/>
-          </a:xfrm>
-          <a:prstGeom prst="rect">
-            <a:avLst/>
-          </a:prstGeom>
-        </p:spPr>
-        <p:txBody>
-          <a:bodyPr wrap="none">
-            <a:spAutoFit/>
-          </a:bodyPr>
-          <a:lstStyle/>
-          <a:p>
-            <a:r>
-              <a:rPr lang="en-US" b="1" dirty="0"/>
-              <a:t>Object Oriented Programming (OOP)</a:t>
-            </a:r>
-            <a:endParaRPr lang="en-US" dirty="0"/>
           </a:p>
         </p:txBody>
       </p:sp>
@@ -5069,11 +5036,7 @@
           <a:p>
             <a:r>
               <a:rPr lang="en-US" noProof="1" smtClean="0"/>
-              <a:t>A java </a:t>
-            </a:r>
-            <a:r>
-              <a:rPr lang="en-US" noProof="1" smtClean="0"/>
-              <a:t>program once compiled can be taken and run on any system/processor which has the corresponding JVM installed.</a:t>
+              <a:t>A java program once compiled can be taken and run on any system/processor which has the corresponding JVM installed.</a:t>
             </a:r>
           </a:p>
           <a:p>
@@ -5346,11 +5309,7 @@
           <a:p>
             <a:r>
               <a:rPr lang="en-US" dirty="0" smtClean="0"/>
-              <a:t>The JDK comes with many tools along with many set of classes referred to as Application Programming Interface (API). </a:t>
-            </a:r>
-            <a:r>
-              <a:rPr lang="en-US" dirty="0" smtClean="0"/>
-              <a:t>The programmer while writing code to implement his desired functionality can make use of these JDK APIs.</a:t>
+              <a:t>The JDK comes with many tools along with many set of classes referred to as Application Programming Interface (API). The programmer while writing code to implement his desired functionality can make use of these JDK APIs.</a:t>
             </a:r>
           </a:p>
           <a:p>
@@ -5382,11 +5341,7 @@
             <a:pPr lvl="1"/>
             <a:r>
               <a:rPr lang="en-US" dirty="0" smtClean="0"/>
-              <a:t>Java : JVM responsible for running a Jav</a:t>
-            </a:r>
-            <a:r>
-              <a:rPr lang="en-US" dirty="0" smtClean="0"/>
-              <a:t>a program</a:t>
+              <a:t>Java : JVM responsible for running a Java program</a:t>
             </a:r>
           </a:p>
           <a:p>
@@ -5409,13 +5364,8 @@
           <a:p>
             <a:r>
               <a:rPr lang="en-US" dirty="0" smtClean="0"/>
-              <a:t>Java Runtime Environment is a combination of Java virtual machine (JVM)</a:t>
-            </a:r>
-            <a:r>
-              <a:rPr lang="en-US" dirty="0" smtClean="0"/>
-              <a:t>,a program that runs the java code, and collection of core java APIs.</a:t>
-            </a:r>
-            <a:endParaRPr lang="en-US" dirty="0" smtClean="0"/>
+              <a:t>Java Runtime Environment is a combination of Java virtual machine (JVM),a program that runs the java code, and collection of core java APIs.</a:t>
+            </a:r>
           </a:p>
           <a:p>
             <a:endParaRPr lang="en-US" dirty="0" smtClean="0"/>
@@ -5924,7 +5874,6 @@
               <a:rPr lang="en-US" dirty="0" smtClean="0"/>
               <a:t>OpenJ9. </a:t>
             </a:r>
-            <a:endParaRPr lang="en-US" dirty="0" smtClean="0"/>
           </a:p>
           <a:p>
             <a:endParaRPr lang="en-US" dirty="0" smtClean="0"/>
@@ -6254,50 +6203,25 @@
           <a:p>
             <a:r>
               <a:rPr lang="en-US" dirty="0" smtClean="0"/>
-              <a:t>Java provides </a:t>
-            </a:r>
+              <a:t>Java provides in-built memory management facility.</a:t>
+            </a:r>
+          </a:p>
+          <a:p>
             <a:r>
               <a:rPr lang="en-US" dirty="0" smtClean="0"/>
-              <a:t>in-built </a:t>
-            </a:r>
+              <a:t>Java’s memory manager is referred to as Garbage collector.</a:t>
+            </a:r>
+          </a:p>
+          <a:p>
             <a:r>
               <a:rPr lang="en-US" dirty="0" smtClean="0"/>
-              <a:t>memory management facility.</a:t>
+              <a:t>A java programmer does not need to take care of creating and destroying memory.</a:t>
             </a:r>
           </a:p>
           <a:p>
             <a:r>
               <a:rPr lang="en-US" dirty="0" smtClean="0"/>
-              <a:t>Java’s memory manager is referred to as </a:t>
-            </a:r>
-            <a:r>
-              <a:rPr lang="en-US" dirty="0" smtClean="0"/>
-              <a:t>Garbage </a:t>
-            </a:r>
-            <a:r>
-              <a:rPr lang="en-US" dirty="0" smtClean="0"/>
-              <a:t>collector.</a:t>
-            </a:r>
-          </a:p>
-          <a:p>
-            <a:r>
-              <a:rPr lang="en-US" dirty="0" smtClean="0"/>
-              <a:t>A java programmer does not need to take care of creating and destroying </a:t>
-            </a:r>
-            <a:r>
-              <a:rPr lang="en-US" dirty="0" smtClean="0"/>
-              <a:t>memory.</a:t>
-            </a:r>
-            <a:endParaRPr lang="en-US" dirty="0" smtClean="0"/>
-          </a:p>
-          <a:p>
-            <a:r>
-              <a:rPr lang="en-US" dirty="0" smtClean="0"/>
-              <a:t>Earlier in languages like C , it was required to first reserve memory and after usage it had to </a:t>
-            </a:r>
-            <a:r>
-              <a:rPr lang="en-US" dirty="0" smtClean="0"/>
-              <a:t>destroyed. The programmer was required to perform all the memory allocation and releasing work.</a:t>
+              <a:t>Earlier in languages like C , it was required to first reserve memory and after usage it had to destroyed. The programmer was required to perform all the memory allocation and releasing work.</a:t>
             </a:r>
           </a:p>
           <a:p>
@@ -6311,24 +6235,11 @@
               <a:rPr lang="en-US" dirty="0" smtClean="0"/>
               <a:t>A memory leak happens when the programmer allocated some memory and then forgot to deallocate it. This memory was practically unusable because it remained acquired and unusable for rest part of the program.</a:t>
             </a:r>
-            <a:endParaRPr lang="en-US" dirty="0" smtClean="0"/>
           </a:p>
           <a:p>
             <a:r>
               <a:rPr lang="en-US" dirty="0" smtClean="0"/>
-              <a:t>In </a:t>
-            </a:r>
-            <a:r>
-              <a:rPr lang="en-US" dirty="0" smtClean="0"/>
-              <a:t>Java however, </a:t>
-            </a:r>
-            <a:r>
-              <a:rPr lang="en-US" dirty="0" smtClean="0"/>
-              <a:t>a programmer can just signal the garbage collector to run but it is the sole responsibility of java runtime system to run garbage collector</a:t>
-            </a:r>
-            <a:r>
-              <a:rPr lang="en-US" dirty="0" smtClean="0"/>
-              <a:t>.</a:t>
+              <a:t>In Java however, a programmer can just signal the garbage collector to run but it is the sole responsibility of java runtime system to run garbage collector.</a:t>
             </a:r>
           </a:p>
           <a:p>
@@ -6336,7 +6247,6 @@
               <a:rPr lang="en-US" dirty="0" smtClean="0"/>
               <a:t>A Java programmer still needs to take care that he writes code that is memory efficient.</a:t>
             </a:r>
-            <a:endParaRPr lang="en-US" dirty="0" smtClean="0"/>
           </a:p>
           <a:p>
             <a:endParaRPr lang="en-US" dirty="0"/>
@@ -7721,9 +7631,16 @@
 <file path=customXml/itemProps2.xml><?xml version="1.0" encoding="utf-8"?>
 <ds:datastoreItem xmlns:ds="http://schemas.openxmlformats.org/officeDocument/2006/customXml" ds:itemID="{F4E32C0B-4052-44CB-9341-8AD8B2CC4712}">
   <ds:schemaRefs>
+    <ds:schemaRef ds:uri="http://schemas.microsoft.com/office/2006/documentManagement/types"/>
+    <ds:schemaRef ds:uri="http://schemas.openxmlformats.org/package/2006/metadata/core-properties"/>
+    <ds:schemaRef ds:uri="16c05727-aa75-4e4a-9b5f-8a80a1165891"/>
+    <ds:schemaRef ds:uri="http://purl.org/dc/dcmitype/"/>
+    <ds:schemaRef ds:uri="http://schemas.microsoft.com/office/infopath/2007/PartnerControls"/>
+    <ds:schemaRef ds:uri="http://purl.org/dc/elements/1.1/"/>
     <ds:schemaRef ds:uri="http://schemas.microsoft.com/office/2006/metadata/properties"/>
-    <ds:schemaRef ds:uri="http://schemas.microsoft.com/office/infopath/2007/PartnerControls"/>
     <ds:schemaRef ds:uri="71af3243-3dd4-4a8d-8c0d-dd76da1f02a5"/>
+    <ds:schemaRef ds:uri="http://www.w3.org/XML/1998/namespace"/>
+    <ds:schemaRef ds:uri="http://purl.org/dc/terms/"/>
   </ds:schemaRefs>
 </ds:datastoreItem>
 </file>

</xml_diff>